<commit_message>
Mentioned the feedback changes in the script file along with presentation script
</commit_message>
<xml_diff>
--- a/Youth_marijuana_use_analysis.pptx
+++ b/Youth_marijuana_use_analysis.pptx
@@ -11684,8 +11684,8 @@
         </p:nvSpPr>
         <p:spPr>
           <a:xfrm>
-            <a:off x="595731" y="1017725"/>
-            <a:ext cx="7559040" cy="3924151"/>
+            <a:off x="483933" y="919442"/>
+            <a:ext cx="7559040" cy="3931846"/>
           </a:xfrm>
           <a:prstGeom prst="rect">
             <a:avLst/>
@@ -11698,6 +11698,11 @@
           </a:bodyPr>
           <a:lstStyle/>
           <a:p>
+            <a:pPr>
+              <a:lnSpc>
+                <a:spcPct val="150000"/>
+              </a:lnSpc>
+            </a:pPr>
             <a:r>
               <a:rPr lang="en-US" b="1" dirty="0">
                 <a:latin typeface="Times New Roman" panose="02020603050405020304" pitchFamily="18" charset="0"/>
@@ -11707,58 +11712,49 @@
             </a:r>
           </a:p>
           <a:p>
+            <a:pPr>
+              <a:lnSpc>
+                <a:spcPct val="150000"/>
+              </a:lnSpc>
+            </a:pPr>
             <a:r>
               <a:rPr lang="en-US" sz="1200" dirty="0">
                 <a:latin typeface="Times New Roman" panose="02020603050405020304" pitchFamily="18" charset="0"/>
                 <a:cs typeface="Times New Roman" panose="02020603050405020304" pitchFamily="18" charset="0"/>
               </a:rPr>
-              <a:t>- </a:t>
+              <a:t>-  </a:t>
             </a:r>
             <a:r>
               <a:rPr lang="en-US" sz="1300" dirty="0">
                 <a:latin typeface="Times New Roman" panose="02020603050405020304" pitchFamily="18" charset="0"/>
                 <a:cs typeface="Times New Roman" panose="02020603050405020304" pitchFamily="18" charset="0"/>
               </a:rPr>
-              <a:t>Removed the data with missing values or the column where the response is not known.</a:t>
+              <a:t>Removed the data with missing values and renamed the columns</a:t>
             </a:r>
           </a:p>
           <a:p>
-            <a:pPr marL="171450" indent="-171450">
-              <a:buFontTx/>
-              <a:buChar char="-"/>
-            </a:pPr>
             <a:r>
               <a:rPr lang="en-US" sz="1300" dirty="0">
                 <a:latin typeface="Times New Roman" panose="02020603050405020304" pitchFamily="18" charset="0"/>
                 <a:cs typeface="Times New Roman" panose="02020603050405020304" pitchFamily="18" charset="0"/>
               </a:rPr>
-              <a:t>Renamed the columns</a:t>
+              <a:t>- One hot encoding for categorical variables</a:t>
             </a:r>
           </a:p>
           <a:p>
-            <a:pPr marL="171450" indent="-171450">
-              <a:buFontTx/>
-              <a:buChar char="-"/>
-            </a:pPr>
+            <a:r>
+              <a:rPr lang="en-US" sz="1300">
+                <a:latin typeface="Times New Roman" panose="02020603050405020304" pitchFamily="18" charset="0"/>
+                <a:cs typeface="Times New Roman" panose="02020603050405020304" pitchFamily="18" charset="0"/>
+              </a:rPr>
+              <a:t>- Mapped </a:t>
+            </a:r>
             <a:r>
               <a:rPr lang="en-US" sz="1300" dirty="0">
                 <a:latin typeface="Times New Roman" panose="02020603050405020304" pitchFamily="18" charset="0"/>
                 <a:cs typeface="Times New Roman" panose="02020603050405020304" pitchFamily="18" charset="0"/>
               </a:rPr>
-              <a:t>One hot encoding for categorical variables</a:t>
-            </a:r>
-          </a:p>
-          <a:p>
-            <a:pPr marL="171450" indent="-171450">
-              <a:buFontTx/>
-              <a:buChar char="-"/>
-            </a:pPr>
-            <a:r>
-              <a:rPr lang="en-US" sz="1300" dirty="0">
-                <a:latin typeface="Times New Roman" panose="02020603050405020304" pitchFamily="18" charset="0"/>
-                <a:cs typeface="Times New Roman" panose="02020603050405020304" pitchFamily="18" charset="0"/>
-              </a:rPr>
-              <a:t>Mapped ordinal labels to suitable class names</a:t>
+              <a:t>ordinal labels to suitable class names</a:t>
             </a:r>
           </a:p>
           <a:p>

</xml_diff>